<commit_message>
Updates to logging, thesis, and presentation
</commit_message>
<xml_diff>
--- a/Documentation/Thesis/Submission Draft/mkozak - Intent Recognition Engine.pptx
+++ b/Documentation/Thesis/Submission Draft/mkozak - Intent Recognition Engine.pptx
@@ -5,7 +5,7 @@
     <p:sldMasterId id="2147483660" r:id="rId1"/>
   </p:sldMasterIdLst>
   <p:notesMasterIdLst>
-    <p:notesMasterId r:id="rId47"/>
+    <p:notesMasterId r:id="rId51"/>
   </p:notesMasterIdLst>
   <p:sldIdLst>
     <p:sldId id="256" r:id="rId2"/>
@@ -43,16 +43,20 @@
     <p:sldId id="273" r:id="rId34"/>
     <p:sldId id="303" r:id="rId35"/>
     <p:sldId id="304" r:id="rId36"/>
-    <p:sldId id="294" r:id="rId37"/>
-    <p:sldId id="308" r:id="rId38"/>
-    <p:sldId id="313" r:id="rId39"/>
-    <p:sldId id="267" r:id="rId40"/>
-    <p:sldId id="307" r:id="rId41"/>
-    <p:sldId id="306" r:id="rId42"/>
-    <p:sldId id="266" r:id="rId43"/>
-    <p:sldId id="299" r:id="rId44"/>
-    <p:sldId id="300" r:id="rId45"/>
-    <p:sldId id="280" r:id="rId46"/>
+    <p:sldId id="319" r:id="rId37"/>
+    <p:sldId id="294" r:id="rId38"/>
+    <p:sldId id="308" r:id="rId39"/>
+    <p:sldId id="313" r:id="rId40"/>
+    <p:sldId id="318" r:id="rId41"/>
+    <p:sldId id="315" r:id="rId42"/>
+    <p:sldId id="317" r:id="rId43"/>
+    <p:sldId id="316" r:id="rId44"/>
+    <p:sldId id="307" r:id="rId45"/>
+    <p:sldId id="306" r:id="rId46"/>
+    <p:sldId id="266" r:id="rId47"/>
+    <p:sldId id="299" r:id="rId48"/>
+    <p:sldId id="300" r:id="rId49"/>
+    <p:sldId id="280" r:id="rId50"/>
   </p:sldIdLst>
   <p:sldSz cx="9144000" cy="5715000" type="screen16x10"/>
   <p:notesSz cx="6858000" cy="9144000"/>
@@ -171,6 +175,406 @@
 </file>
 
 <file path=ppt/charts/chart1.xml><?xml version="1.0" encoding="utf-8"?>
+<c:chartSpace xmlns:c="http://schemas.openxmlformats.org/drawingml/2006/chart" xmlns:a="http://schemas.openxmlformats.org/drawingml/2006/main" xmlns:r="http://schemas.openxmlformats.org/officeDocument/2006/relationships" xmlns:c16r2="http://schemas.microsoft.com/office/drawing/2015/06/chart">
+  <c:date1904 val="0"/>
+  <c:lang val="en-US"/>
+  <c:roundedCorners val="0"/>
+  <mc:AlternateContent xmlns:mc="http://schemas.openxmlformats.org/markup-compatibility/2006">
+    <mc:Choice xmlns:c14="http://schemas.microsoft.com/office/drawing/2007/8/2/chart" Requires="c14">
+      <c14:style val="102"/>
+    </mc:Choice>
+    <mc:Fallback>
+      <c:style val="2"/>
+    </mc:Fallback>
+  </mc:AlternateContent>
+  <c:chart>
+    <c:title>
+      <c:tx>
+        <c:rich>
+          <a:bodyPr rot="0" spcFirstLastPara="1" vertOverflow="ellipsis" vert="horz" wrap="square" anchor="ctr" anchorCtr="1"/>
+          <a:lstStyle/>
+          <a:p>
+            <a:pPr>
+              <a:defRPr sz="1862" b="0" i="0" u="none" strike="noStrike" kern="1200" spc="0" baseline="0">
+                <a:solidFill>
+                  <a:schemeClr val="tx1">
+                    <a:lumMod val="65000"/>
+                    <a:lumOff val="35000"/>
+                  </a:schemeClr>
+                </a:solidFill>
+                <a:latin typeface="+mn-lt"/>
+                <a:ea typeface="+mn-ea"/>
+                <a:cs typeface="+mn-cs"/>
+              </a:defRPr>
+            </a:pPr>
+            <a:r>
+              <a:rPr lang="en-US" dirty="0"/>
+              <a:t>Comparative Win Rates</a:t>
+            </a:r>
+          </a:p>
+        </c:rich>
+      </c:tx>
+      <c:overlay val="0"/>
+      <c:spPr>
+        <a:noFill/>
+        <a:ln>
+          <a:noFill/>
+        </a:ln>
+        <a:effectLst/>
+      </c:spPr>
+      <c:txPr>
+        <a:bodyPr rot="0" spcFirstLastPara="1" vertOverflow="ellipsis" vert="horz" wrap="square" anchor="ctr" anchorCtr="1"/>
+        <a:lstStyle/>
+        <a:p>
+          <a:pPr>
+            <a:defRPr sz="1862" b="0" i="0" u="none" strike="noStrike" kern="1200" spc="0" baseline="0">
+              <a:solidFill>
+                <a:schemeClr val="tx1">
+                  <a:lumMod val="65000"/>
+                  <a:lumOff val="35000"/>
+                </a:schemeClr>
+              </a:solidFill>
+              <a:latin typeface="+mn-lt"/>
+              <a:ea typeface="+mn-ea"/>
+              <a:cs typeface="+mn-cs"/>
+            </a:defRPr>
+          </a:pPr>
+          <a:endParaRPr lang="en-US"/>
+        </a:p>
+      </c:txPr>
+    </c:title>
+    <c:autoTitleDeleted val="0"/>
+    <c:plotArea>
+      <c:layout/>
+      <c:barChart>
+        <c:barDir val="col"/>
+        <c:grouping val="clustered"/>
+        <c:varyColors val="0"/>
+        <c:ser>
+          <c:idx val="0"/>
+          <c:order val="0"/>
+          <c:tx>
+            <c:strRef>
+              <c:f>Sheet1!$B$1</c:f>
+              <c:strCache>
+                <c:ptCount val="1"/>
+                <c:pt idx="0">
+                  <c:v>NOVA</c:v>
+                </c:pt>
+              </c:strCache>
+            </c:strRef>
+          </c:tx>
+          <c:spPr>
+            <a:solidFill>
+              <a:schemeClr val="accent1"/>
+            </a:solidFill>
+            <a:ln>
+              <a:noFill/>
+            </a:ln>
+            <a:effectLst/>
+          </c:spPr>
+          <c:invertIfNegative val="0"/>
+          <c:cat>
+            <c:strRef>
+              <c:f>Sheet1!$A$2:$A$4</c:f>
+              <c:strCache>
+                <c:ptCount val="3"/>
+                <c:pt idx="0">
+                  <c:v>Terran</c:v>
+                </c:pt>
+                <c:pt idx="1">
+                  <c:v>Protoss</c:v>
+                </c:pt>
+                <c:pt idx="2">
+                  <c:v>Zerg</c:v>
+                </c:pt>
+              </c:strCache>
+            </c:strRef>
+          </c:cat>
+          <c:val>
+            <c:numRef>
+              <c:f>Sheet1!$B$2:$B$4</c:f>
+              <c:numCache>
+                <c:formatCode>General</c:formatCode>
+                <c:ptCount val="3"/>
+                <c:pt idx="0">
+                  <c:v>0.25974025974025972</c:v>
+                </c:pt>
+                <c:pt idx="1">
+                  <c:v>0.98888888888888893</c:v>
+                </c:pt>
+                <c:pt idx="2">
+                  <c:v>0.84466019417475724</c:v>
+                </c:pt>
+              </c:numCache>
+            </c:numRef>
+          </c:val>
+          <c:extLst>
+            <c:ext xmlns:c16="http://schemas.microsoft.com/office/drawing/2014/chart" uri="{C3380CC4-5D6E-409C-BE32-E72D297353CC}">
+              <c16:uniqueId val="{00000000-409C-43C7-8906-C106EB34D8B8}"/>
+            </c:ext>
+          </c:extLst>
+        </c:ser>
+        <c:ser>
+          <c:idx val="1"/>
+          <c:order val="1"/>
+          <c:tx>
+            <c:strRef>
+              <c:f>Sheet1!$C$1</c:f>
+              <c:strCache>
+                <c:ptCount val="1"/>
+                <c:pt idx="0">
+                  <c:v>IRE</c:v>
+                </c:pt>
+              </c:strCache>
+            </c:strRef>
+          </c:tx>
+          <c:spPr>
+            <a:solidFill>
+              <a:schemeClr val="accent2"/>
+            </a:solidFill>
+            <a:ln>
+              <a:noFill/>
+            </a:ln>
+            <a:effectLst/>
+          </c:spPr>
+          <c:invertIfNegative val="0"/>
+          <c:cat>
+            <c:strRef>
+              <c:f>Sheet1!$A$2:$A$4</c:f>
+              <c:strCache>
+                <c:ptCount val="3"/>
+                <c:pt idx="0">
+                  <c:v>Terran</c:v>
+                </c:pt>
+                <c:pt idx="1">
+                  <c:v>Protoss</c:v>
+                </c:pt>
+                <c:pt idx="2">
+                  <c:v>Zerg</c:v>
+                </c:pt>
+              </c:strCache>
+            </c:strRef>
+          </c:cat>
+          <c:val>
+            <c:numRef>
+              <c:f>Sheet1!$C$2:$C$4</c:f>
+              <c:numCache>
+                <c:formatCode>General</c:formatCode>
+                <c:ptCount val="3"/>
+                <c:pt idx="0">
+                  <c:v>0.04</c:v>
+                </c:pt>
+                <c:pt idx="1">
+                  <c:v>0.66666666699999999</c:v>
+                </c:pt>
+                <c:pt idx="2">
+                  <c:v>0.94736842099999996</c:v>
+                </c:pt>
+              </c:numCache>
+            </c:numRef>
+          </c:val>
+          <c:extLst>
+            <c:ext xmlns:c16="http://schemas.microsoft.com/office/drawing/2014/chart" uri="{C3380CC4-5D6E-409C-BE32-E72D297353CC}">
+              <c16:uniqueId val="{00000001-409C-43C7-8906-C106EB34D8B8}"/>
+            </c:ext>
+          </c:extLst>
+        </c:ser>
+        <c:dLbls>
+          <c:showLegendKey val="0"/>
+          <c:showVal val="0"/>
+          <c:showCatName val="0"/>
+          <c:showSerName val="0"/>
+          <c:showPercent val="0"/>
+          <c:showBubbleSize val="0"/>
+        </c:dLbls>
+        <c:gapWidth val="219"/>
+        <c:overlap val="-27"/>
+        <c:axId val="142245248"/>
+        <c:axId val="269120640"/>
+      </c:barChart>
+      <c:catAx>
+        <c:axId val="142245248"/>
+        <c:scaling>
+          <c:orientation val="minMax"/>
+        </c:scaling>
+        <c:delete val="0"/>
+        <c:axPos val="b"/>
+        <c:numFmt formatCode="General" sourceLinked="1"/>
+        <c:majorTickMark val="none"/>
+        <c:minorTickMark val="none"/>
+        <c:tickLblPos val="nextTo"/>
+        <c:spPr>
+          <a:noFill/>
+          <a:ln w="9525" cap="flat" cmpd="sng" algn="ctr">
+            <a:solidFill>
+              <a:schemeClr val="tx1">
+                <a:lumMod val="15000"/>
+                <a:lumOff val="85000"/>
+              </a:schemeClr>
+            </a:solidFill>
+            <a:round/>
+          </a:ln>
+          <a:effectLst/>
+        </c:spPr>
+        <c:txPr>
+          <a:bodyPr rot="-60000000" spcFirstLastPara="1" vertOverflow="ellipsis" vert="horz" wrap="square" anchor="ctr" anchorCtr="1"/>
+          <a:lstStyle/>
+          <a:p>
+            <a:pPr>
+              <a:defRPr sz="1197" b="0" i="0" u="none" strike="noStrike" kern="1200" baseline="0">
+                <a:solidFill>
+                  <a:schemeClr val="tx1">
+                    <a:lumMod val="65000"/>
+                    <a:lumOff val="35000"/>
+                  </a:schemeClr>
+                </a:solidFill>
+                <a:latin typeface="+mn-lt"/>
+                <a:ea typeface="+mn-ea"/>
+                <a:cs typeface="+mn-cs"/>
+              </a:defRPr>
+            </a:pPr>
+            <a:endParaRPr lang="en-US"/>
+          </a:p>
+        </c:txPr>
+        <c:crossAx val="269120640"/>
+        <c:crosses val="autoZero"/>
+        <c:auto val="1"/>
+        <c:lblAlgn val="ctr"/>
+        <c:lblOffset val="100"/>
+        <c:noMultiLvlLbl val="0"/>
+      </c:catAx>
+      <c:valAx>
+        <c:axId val="269120640"/>
+        <c:scaling>
+          <c:orientation val="minMax"/>
+          <c:max val="1"/>
+        </c:scaling>
+        <c:delete val="0"/>
+        <c:axPos val="l"/>
+        <c:majorGridlines>
+          <c:spPr>
+            <a:ln w="9525" cap="flat" cmpd="sng" algn="ctr">
+              <a:solidFill>
+                <a:schemeClr val="tx1">
+                  <a:lumMod val="15000"/>
+                  <a:lumOff val="85000"/>
+                </a:schemeClr>
+              </a:solidFill>
+              <a:round/>
+            </a:ln>
+            <a:effectLst/>
+          </c:spPr>
+        </c:majorGridlines>
+        <c:numFmt formatCode="General" sourceLinked="1"/>
+        <c:majorTickMark val="none"/>
+        <c:minorTickMark val="none"/>
+        <c:tickLblPos val="nextTo"/>
+        <c:spPr>
+          <a:noFill/>
+          <a:ln>
+            <a:noFill/>
+          </a:ln>
+          <a:effectLst/>
+        </c:spPr>
+        <c:txPr>
+          <a:bodyPr rot="-60000000" spcFirstLastPara="1" vertOverflow="ellipsis" vert="horz" wrap="square" anchor="ctr" anchorCtr="1"/>
+          <a:lstStyle/>
+          <a:p>
+            <a:pPr>
+              <a:defRPr sz="1197" b="0" i="0" u="none" strike="noStrike" kern="1200" baseline="0">
+                <a:solidFill>
+                  <a:schemeClr val="tx1">
+                    <a:lumMod val="65000"/>
+                    <a:lumOff val="35000"/>
+                  </a:schemeClr>
+                </a:solidFill>
+                <a:latin typeface="+mn-lt"/>
+                <a:ea typeface="+mn-ea"/>
+                <a:cs typeface="+mn-cs"/>
+              </a:defRPr>
+            </a:pPr>
+            <a:endParaRPr lang="en-US"/>
+          </a:p>
+        </c:txPr>
+        <c:crossAx val="142245248"/>
+        <c:crosses val="autoZero"/>
+        <c:crossBetween val="between"/>
+      </c:valAx>
+      <c:spPr>
+        <a:noFill/>
+        <a:ln>
+          <a:noFill/>
+        </a:ln>
+        <a:effectLst/>
+      </c:spPr>
+    </c:plotArea>
+    <c:legend>
+      <c:legendPos val="b"/>
+      <c:overlay val="0"/>
+      <c:spPr>
+        <a:noFill/>
+        <a:ln>
+          <a:noFill/>
+        </a:ln>
+        <a:effectLst/>
+      </c:spPr>
+      <c:txPr>
+        <a:bodyPr rot="0" spcFirstLastPara="1" vertOverflow="ellipsis" vert="horz" wrap="square" anchor="ctr" anchorCtr="1"/>
+        <a:lstStyle/>
+        <a:p>
+          <a:pPr>
+            <a:defRPr sz="1197" b="0" i="0" u="none" strike="noStrike" kern="1200" baseline="0">
+              <a:solidFill>
+                <a:schemeClr val="tx1">
+                  <a:lumMod val="65000"/>
+                  <a:lumOff val="35000"/>
+                </a:schemeClr>
+              </a:solidFill>
+              <a:latin typeface="+mn-lt"/>
+              <a:ea typeface="+mn-ea"/>
+              <a:cs typeface="+mn-cs"/>
+            </a:defRPr>
+          </a:pPr>
+          <a:endParaRPr lang="en-US"/>
+        </a:p>
+      </c:txPr>
+    </c:legend>
+    <c:plotVisOnly val="1"/>
+    <c:dispBlanksAs val="gap"/>
+    <c:extLst>
+      <c:ext xmlns:c16r3="http://schemas.microsoft.com/office/drawing/2017/03/chart" uri="{56B9EC1D-385E-4148-901F-78D8002777C0}">
+        <c16r3:dataDisplayOptions16>
+          <c16r3:dispNaAsBlank val="1"/>
+        </c16r3:dataDisplayOptions16>
+      </c:ext>
+    </c:extLst>
+    <c:showDLblsOverMax val="0"/>
+  </c:chart>
+  <c:spPr>
+    <a:noFill/>
+    <a:ln>
+      <a:noFill/>
+    </a:ln>
+    <a:effectLst/>
+  </c:spPr>
+  <c:txPr>
+    <a:bodyPr/>
+    <a:lstStyle/>
+    <a:p>
+      <a:pPr>
+        <a:defRPr/>
+      </a:pPr>
+      <a:endParaRPr lang="en-US"/>
+    </a:p>
+  </c:txPr>
+  <c:externalData r:id="rId3">
+    <c:autoUpdate val="0"/>
+  </c:externalData>
+</c:chartSpace>
+</file>
+
+<file path=ppt/charts/chart2.xml><?xml version="1.0" encoding="utf-8"?>
 <c:chartSpace xmlns:c="http://schemas.openxmlformats.org/drawingml/2006/chart" xmlns:a="http://schemas.openxmlformats.org/drawingml/2006/main" xmlns:r="http://schemas.openxmlformats.org/officeDocument/2006/relationships" xmlns:c16r2="http://schemas.microsoft.com/office/drawing/2015/06/chart">
   <c:date1904 val="0"/>
   <c:lang val="en-US"/>
@@ -569,7 +973,7 @@
 </c:chartSpace>
 </file>
 
-<file path=ppt/charts/chart2.xml><?xml version="1.0" encoding="utf-8"?>
+<file path=ppt/charts/chart3.xml><?xml version="1.0" encoding="utf-8"?>
 <c:chartSpace xmlns:c="http://schemas.openxmlformats.org/drawingml/2006/chart" xmlns:a="http://schemas.openxmlformats.org/drawingml/2006/main" xmlns:r="http://schemas.openxmlformats.org/officeDocument/2006/relationships" xmlns:c16r2="http://schemas.microsoft.com/office/drawing/2015/06/chart">
   <c:date1904 val="0"/>
   <c:lang val="en-US"/>
@@ -968,7 +1372,7 @@
 </c:chartSpace>
 </file>
 
-<file path=ppt/charts/chart3.xml><?xml version="1.0" encoding="utf-8"?>
+<file path=ppt/charts/chart4.xml><?xml version="1.0" encoding="utf-8"?>
 <c:chartSpace xmlns:c="http://schemas.openxmlformats.org/drawingml/2006/chart" xmlns:a="http://schemas.openxmlformats.org/drawingml/2006/main" xmlns:r="http://schemas.openxmlformats.org/officeDocument/2006/relationships" xmlns:c16r2="http://schemas.microsoft.com/office/drawing/2015/06/chart">
   <c:date1904 val="0"/>
   <c:lang val="en-US"/>
@@ -1242,6 +1646,7 @@
         <c:axId val="269120640"/>
         <c:scaling>
           <c:orientation val="minMax"/>
+          <c:max val="1"/>
         </c:scaling>
         <c:delete val="0"/>
         <c:axPos val="l"/>
@@ -1448,6 +1853,46 @@
 </file>
 
 <file path=ppt/charts/colors3.xml><?xml version="1.0" encoding="utf-8"?>
+<cs:colorStyle xmlns:cs="http://schemas.microsoft.com/office/drawing/2012/chartStyle" xmlns:a="http://schemas.openxmlformats.org/drawingml/2006/main" meth="cycle" id="10">
+  <a:schemeClr val="accent1"/>
+  <a:schemeClr val="accent2"/>
+  <a:schemeClr val="accent3"/>
+  <a:schemeClr val="accent4"/>
+  <a:schemeClr val="accent5"/>
+  <a:schemeClr val="accent6"/>
+  <cs:variation/>
+  <cs:variation>
+    <a:lumMod val="60000"/>
+  </cs:variation>
+  <cs:variation>
+    <a:lumMod val="80000"/>
+    <a:lumOff val="20000"/>
+  </cs:variation>
+  <cs:variation>
+    <a:lumMod val="80000"/>
+  </cs:variation>
+  <cs:variation>
+    <a:lumMod val="60000"/>
+    <a:lumOff val="40000"/>
+  </cs:variation>
+  <cs:variation>
+    <a:lumMod val="50000"/>
+  </cs:variation>
+  <cs:variation>
+    <a:lumMod val="70000"/>
+    <a:lumOff val="30000"/>
+  </cs:variation>
+  <cs:variation>
+    <a:lumMod val="70000"/>
+  </cs:variation>
+  <cs:variation>
+    <a:lumMod val="50000"/>
+    <a:lumOff val="50000"/>
+  </cs:variation>
+</cs:colorStyle>
+</file>
+
+<file path=ppt/charts/colors4.xml><?xml version="1.0" encoding="utf-8"?>
 <cs:colorStyle xmlns:cs="http://schemas.microsoft.com/office/drawing/2012/chartStyle" xmlns:a="http://schemas.openxmlformats.org/drawingml/2006/main" meth="cycle" id="10">
   <a:schemeClr val="accent1"/>
   <a:schemeClr val="accent2"/>
@@ -2996,6 +3441,509 @@
 </cs:chartStyle>
 </file>
 
+<file path=ppt/charts/style4.xml><?xml version="1.0" encoding="utf-8"?>
+<cs:chartStyle xmlns:cs="http://schemas.microsoft.com/office/drawing/2012/chartStyle" xmlns:a="http://schemas.openxmlformats.org/drawingml/2006/main" id="201">
+  <cs:axisTitle>
+    <cs:lnRef idx="0"/>
+    <cs:fillRef idx="0"/>
+    <cs:effectRef idx="0"/>
+    <cs:fontRef idx="minor">
+      <a:schemeClr val="tx1">
+        <a:lumMod val="65000"/>
+        <a:lumOff val="35000"/>
+      </a:schemeClr>
+    </cs:fontRef>
+    <cs:defRPr sz="1330" kern="1200"/>
+  </cs:axisTitle>
+  <cs:categoryAxis>
+    <cs:lnRef idx="0"/>
+    <cs:fillRef idx="0"/>
+    <cs:effectRef idx="0"/>
+    <cs:fontRef idx="minor">
+      <a:schemeClr val="tx1">
+        <a:lumMod val="65000"/>
+        <a:lumOff val="35000"/>
+      </a:schemeClr>
+    </cs:fontRef>
+    <cs:spPr>
+      <a:ln w="9525" cap="flat" cmpd="sng" algn="ctr">
+        <a:solidFill>
+          <a:schemeClr val="tx1">
+            <a:lumMod val="15000"/>
+            <a:lumOff val="85000"/>
+          </a:schemeClr>
+        </a:solidFill>
+        <a:round/>
+      </a:ln>
+    </cs:spPr>
+    <cs:defRPr sz="1197" kern="1200"/>
+  </cs:categoryAxis>
+  <cs:chartArea mods="allowNoFillOverride allowNoLineOverride">
+    <cs:lnRef idx="0"/>
+    <cs:fillRef idx="0"/>
+    <cs:effectRef idx="0"/>
+    <cs:fontRef idx="minor">
+      <a:schemeClr val="tx1"/>
+    </cs:fontRef>
+    <cs:spPr>
+      <a:solidFill>
+        <a:schemeClr val="bg1"/>
+      </a:solidFill>
+      <a:ln w="9525" cap="flat" cmpd="sng" algn="ctr">
+        <a:solidFill>
+          <a:schemeClr val="tx1">
+            <a:lumMod val="15000"/>
+            <a:lumOff val="85000"/>
+          </a:schemeClr>
+        </a:solidFill>
+        <a:round/>
+      </a:ln>
+    </cs:spPr>
+    <cs:defRPr sz="1330" kern="1200"/>
+  </cs:chartArea>
+  <cs:dataLabel>
+    <cs:lnRef idx="0"/>
+    <cs:fillRef idx="0"/>
+    <cs:effectRef idx="0"/>
+    <cs:fontRef idx="minor">
+      <a:schemeClr val="tx1">
+        <a:lumMod val="75000"/>
+        <a:lumOff val="25000"/>
+      </a:schemeClr>
+    </cs:fontRef>
+    <cs:defRPr sz="1197" kern="1200"/>
+  </cs:dataLabel>
+  <cs:dataLabelCallout>
+    <cs:lnRef idx="0"/>
+    <cs:fillRef idx="0"/>
+    <cs:effectRef idx="0"/>
+    <cs:fontRef idx="minor">
+      <a:schemeClr val="dk1">
+        <a:lumMod val="65000"/>
+        <a:lumOff val="35000"/>
+      </a:schemeClr>
+    </cs:fontRef>
+    <cs:spPr>
+      <a:solidFill>
+        <a:schemeClr val="lt1"/>
+      </a:solidFill>
+      <a:ln>
+        <a:solidFill>
+          <a:schemeClr val="dk1">
+            <a:lumMod val="25000"/>
+            <a:lumOff val="75000"/>
+          </a:schemeClr>
+        </a:solidFill>
+      </a:ln>
+    </cs:spPr>
+    <cs:defRPr sz="1197" kern="1200"/>
+    <cs:bodyPr rot="0" spcFirstLastPara="1" vertOverflow="clip" horzOverflow="clip" vert="horz" wrap="square" lIns="36576" tIns="18288" rIns="36576" bIns="18288" anchor="ctr" anchorCtr="1">
+      <a:spAutoFit/>
+    </cs:bodyPr>
+  </cs:dataLabelCallout>
+  <cs:dataPoint>
+    <cs:lnRef idx="0"/>
+    <cs:fillRef idx="1">
+      <cs:styleClr val="auto"/>
+    </cs:fillRef>
+    <cs:effectRef idx="0"/>
+    <cs:fontRef idx="minor">
+      <a:schemeClr val="tx1"/>
+    </cs:fontRef>
+  </cs:dataPoint>
+  <cs:dataPoint3D>
+    <cs:lnRef idx="0"/>
+    <cs:fillRef idx="1">
+      <cs:styleClr val="auto"/>
+    </cs:fillRef>
+    <cs:effectRef idx="0"/>
+    <cs:fontRef idx="minor">
+      <a:schemeClr val="tx1"/>
+    </cs:fontRef>
+  </cs:dataPoint3D>
+  <cs:dataPointLine>
+    <cs:lnRef idx="0">
+      <cs:styleClr val="auto"/>
+    </cs:lnRef>
+    <cs:fillRef idx="1"/>
+    <cs:effectRef idx="0"/>
+    <cs:fontRef idx="minor">
+      <a:schemeClr val="tx1"/>
+    </cs:fontRef>
+    <cs:spPr>
+      <a:ln w="28575" cap="rnd">
+        <a:solidFill>
+          <a:schemeClr val="phClr"/>
+        </a:solidFill>
+        <a:round/>
+      </a:ln>
+    </cs:spPr>
+  </cs:dataPointLine>
+  <cs:dataPointMarker>
+    <cs:lnRef idx="0">
+      <cs:styleClr val="auto"/>
+    </cs:lnRef>
+    <cs:fillRef idx="1">
+      <cs:styleClr val="auto"/>
+    </cs:fillRef>
+    <cs:effectRef idx="0"/>
+    <cs:fontRef idx="minor">
+      <a:schemeClr val="tx1"/>
+    </cs:fontRef>
+    <cs:spPr>
+      <a:ln w="9525">
+        <a:solidFill>
+          <a:schemeClr val="phClr"/>
+        </a:solidFill>
+      </a:ln>
+    </cs:spPr>
+  </cs:dataPointMarker>
+  <cs:dataPointMarkerLayout symbol="circle" size="5"/>
+  <cs:dataPointWireframe>
+    <cs:lnRef idx="0">
+      <cs:styleClr val="auto"/>
+    </cs:lnRef>
+    <cs:fillRef idx="1"/>
+    <cs:effectRef idx="0"/>
+    <cs:fontRef idx="minor">
+      <a:schemeClr val="tx1"/>
+    </cs:fontRef>
+    <cs:spPr>
+      <a:ln w="9525" cap="rnd">
+        <a:solidFill>
+          <a:schemeClr val="phClr"/>
+        </a:solidFill>
+        <a:round/>
+      </a:ln>
+    </cs:spPr>
+  </cs:dataPointWireframe>
+  <cs:dataTable>
+    <cs:lnRef idx="0"/>
+    <cs:fillRef idx="0"/>
+    <cs:effectRef idx="0"/>
+    <cs:fontRef idx="minor">
+      <a:schemeClr val="tx1">
+        <a:lumMod val="65000"/>
+        <a:lumOff val="35000"/>
+      </a:schemeClr>
+    </cs:fontRef>
+    <cs:spPr>
+      <a:noFill/>
+      <a:ln w="9525" cap="flat" cmpd="sng" algn="ctr">
+        <a:solidFill>
+          <a:schemeClr val="tx1">
+            <a:lumMod val="15000"/>
+            <a:lumOff val="85000"/>
+          </a:schemeClr>
+        </a:solidFill>
+        <a:round/>
+      </a:ln>
+    </cs:spPr>
+    <cs:defRPr sz="1197" kern="1200"/>
+  </cs:dataTable>
+  <cs:downBar>
+    <cs:lnRef idx="0"/>
+    <cs:fillRef idx="0"/>
+    <cs:effectRef idx="0"/>
+    <cs:fontRef idx="minor">
+      <a:schemeClr val="dk1"/>
+    </cs:fontRef>
+    <cs:spPr>
+      <a:solidFill>
+        <a:schemeClr val="dk1">
+          <a:lumMod val="65000"/>
+          <a:lumOff val="35000"/>
+        </a:schemeClr>
+      </a:solidFill>
+      <a:ln w="9525">
+        <a:solidFill>
+          <a:schemeClr val="tx1">
+            <a:lumMod val="65000"/>
+            <a:lumOff val="35000"/>
+          </a:schemeClr>
+        </a:solidFill>
+      </a:ln>
+    </cs:spPr>
+  </cs:downBar>
+  <cs:dropLine>
+    <cs:lnRef idx="0"/>
+    <cs:fillRef idx="0"/>
+    <cs:effectRef idx="0"/>
+    <cs:fontRef idx="minor">
+      <a:schemeClr val="tx1"/>
+    </cs:fontRef>
+    <cs:spPr>
+      <a:ln w="9525" cap="flat" cmpd="sng" algn="ctr">
+        <a:solidFill>
+          <a:schemeClr val="tx1">
+            <a:lumMod val="35000"/>
+            <a:lumOff val="65000"/>
+          </a:schemeClr>
+        </a:solidFill>
+        <a:round/>
+      </a:ln>
+    </cs:spPr>
+  </cs:dropLine>
+  <cs:errorBar>
+    <cs:lnRef idx="0"/>
+    <cs:fillRef idx="0"/>
+    <cs:effectRef idx="0"/>
+    <cs:fontRef idx="minor">
+      <a:schemeClr val="tx1"/>
+    </cs:fontRef>
+    <cs:spPr>
+      <a:ln w="9525" cap="flat" cmpd="sng" algn="ctr">
+        <a:solidFill>
+          <a:schemeClr val="tx1">
+            <a:lumMod val="65000"/>
+            <a:lumOff val="35000"/>
+          </a:schemeClr>
+        </a:solidFill>
+        <a:round/>
+      </a:ln>
+    </cs:spPr>
+  </cs:errorBar>
+  <cs:floor>
+    <cs:lnRef idx="0"/>
+    <cs:fillRef idx="0"/>
+    <cs:effectRef idx="0"/>
+    <cs:fontRef idx="minor">
+      <a:schemeClr val="tx1"/>
+    </cs:fontRef>
+    <cs:spPr>
+      <a:noFill/>
+      <a:ln>
+        <a:noFill/>
+      </a:ln>
+    </cs:spPr>
+  </cs:floor>
+  <cs:gridlineMajor>
+    <cs:lnRef idx="0"/>
+    <cs:fillRef idx="0"/>
+    <cs:effectRef idx="0"/>
+    <cs:fontRef idx="minor">
+      <a:schemeClr val="tx1"/>
+    </cs:fontRef>
+    <cs:spPr>
+      <a:ln w="9525" cap="flat" cmpd="sng" algn="ctr">
+        <a:solidFill>
+          <a:schemeClr val="tx1">
+            <a:lumMod val="15000"/>
+            <a:lumOff val="85000"/>
+          </a:schemeClr>
+        </a:solidFill>
+        <a:round/>
+      </a:ln>
+    </cs:spPr>
+  </cs:gridlineMajor>
+  <cs:gridlineMinor>
+    <cs:lnRef idx="0"/>
+    <cs:fillRef idx="0"/>
+    <cs:effectRef idx="0"/>
+    <cs:fontRef idx="minor">
+      <a:schemeClr val="tx1"/>
+    </cs:fontRef>
+    <cs:spPr>
+      <a:ln w="9525" cap="flat" cmpd="sng" algn="ctr">
+        <a:solidFill>
+          <a:schemeClr val="tx1">
+            <a:lumMod val="5000"/>
+            <a:lumOff val="95000"/>
+          </a:schemeClr>
+        </a:solidFill>
+        <a:round/>
+      </a:ln>
+    </cs:spPr>
+  </cs:gridlineMinor>
+  <cs:hiLoLine>
+    <cs:lnRef idx="0"/>
+    <cs:fillRef idx="0"/>
+    <cs:effectRef idx="0"/>
+    <cs:fontRef idx="minor">
+      <a:schemeClr val="tx1"/>
+    </cs:fontRef>
+    <cs:spPr>
+      <a:ln w="9525" cap="flat" cmpd="sng" algn="ctr">
+        <a:solidFill>
+          <a:schemeClr val="tx1">
+            <a:lumMod val="75000"/>
+            <a:lumOff val="25000"/>
+          </a:schemeClr>
+        </a:solidFill>
+        <a:round/>
+      </a:ln>
+    </cs:spPr>
+  </cs:hiLoLine>
+  <cs:leaderLine>
+    <cs:lnRef idx="0"/>
+    <cs:fillRef idx="0"/>
+    <cs:effectRef idx="0"/>
+    <cs:fontRef idx="minor">
+      <a:schemeClr val="tx1"/>
+    </cs:fontRef>
+    <cs:spPr>
+      <a:ln w="9525" cap="flat" cmpd="sng" algn="ctr">
+        <a:solidFill>
+          <a:schemeClr val="tx1">
+            <a:lumMod val="35000"/>
+            <a:lumOff val="65000"/>
+          </a:schemeClr>
+        </a:solidFill>
+        <a:round/>
+      </a:ln>
+    </cs:spPr>
+  </cs:leaderLine>
+  <cs:legend>
+    <cs:lnRef idx="0"/>
+    <cs:fillRef idx="0"/>
+    <cs:effectRef idx="0"/>
+    <cs:fontRef idx="minor">
+      <a:schemeClr val="tx1">
+        <a:lumMod val="65000"/>
+        <a:lumOff val="35000"/>
+      </a:schemeClr>
+    </cs:fontRef>
+    <cs:defRPr sz="1197" kern="1200"/>
+  </cs:legend>
+  <cs:plotArea mods="allowNoFillOverride allowNoLineOverride">
+    <cs:lnRef idx="0"/>
+    <cs:fillRef idx="0"/>
+    <cs:effectRef idx="0"/>
+    <cs:fontRef idx="minor">
+      <a:schemeClr val="tx1"/>
+    </cs:fontRef>
+  </cs:plotArea>
+  <cs:plotArea3D mods="allowNoFillOverride allowNoLineOverride">
+    <cs:lnRef idx="0"/>
+    <cs:fillRef idx="0"/>
+    <cs:effectRef idx="0"/>
+    <cs:fontRef idx="minor">
+      <a:schemeClr val="tx1"/>
+    </cs:fontRef>
+  </cs:plotArea3D>
+  <cs:seriesAxis>
+    <cs:lnRef idx="0"/>
+    <cs:fillRef idx="0"/>
+    <cs:effectRef idx="0"/>
+    <cs:fontRef idx="minor">
+      <a:schemeClr val="tx1">
+        <a:lumMod val="65000"/>
+        <a:lumOff val="35000"/>
+      </a:schemeClr>
+    </cs:fontRef>
+    <cs:defRPr sz="1197" kern="1200"/>
+  </cs:seriesAxis>
+  <cs:seriesLine>
+    <cs:lnRef idx="0"/>
+    <cs:fillRef idx="0"/>
+    <cs:effectRef idx="0"/>
+    <cs:fontRef idx="minor">
+      <a:schemeClr val="tx1"/>
+    </cs:fontRef>
+    <cs:spPr>
+      <a:ln w="9525" cap="flat" cmpd="sng" algn="ctr">
+        <a:solidFill>
+          <a:schemeClr val="tx1">
+            <a:lumMod val="35000"/>
+            <a:lumOff val="65000"/>
+          </a:schemeClr>
+        </a:solidFill>
+        <a:round/>
+      </a:ln>
+    </cs:spPr>
+  </cs:seriesLine>
+  <cs:title>
+    <cs:lnRef idx="0"/>
+    <cs:fillRef idx="0"/>
+    <cs:effectRef idx="0"/>
+    <cs:fontRef idx="minor">
+      <a:schemeClr val="tx1">
+        <a:lumMod val="65000"/>
+        <a:lumOff val="35000"/>
+      </a:schemeClr>
+    </cs:fontRef>
+    <cs:defRPr sz="1862" b="0" kern="1200" spc="0" baseline="0"/>
+  </cs:title>
+  <cs:trendline>
+    <cs:lnRef idx="0">
+      <cs:styleClr val="auto"/>
+    </cs:lnRef>
+    <cs:fillRef idx="0"/>
+    <cs:effectRef idx="0"/>
+    <cs:fontRef idx="minor">
+      <a:schemeClr val="tx1"/>
+    </cs:fontRef>
+    <cs:spPr>
+      <a:ln w="19050" cap="rnd">
+        <a:solidFill>
+          <a:schemeClr val="phClr"/>
+        </a:solidFill>
+        <a:prstDash val="sysDot"/>
+      </a:ln>
+    </cs:spPr>
+  </cs:trendline>
+  <cs:trendlineLabel>
+    <cs:lnRef idx="0"/>
+    <cs:fillRef idx="0"/>
+    <cs:effectRef idx="0"/>
+    <cs:fontRef idx="minor">
+      <a:schemeClr val="tx1">
+        <a:lumMod val="65000"/>
+        <a:lumOff val="35000"/>
+      </a:schemeClr>
+    </cs:fontRef>
+    <cs:defRPr sz="1197" kern="1200"/>
+  </cs:trendlineLabel>
+  <cs:upBar>
+    <cs:lnRef idx="0"/>
+    <cs:fillRef idx="0"/>
+    <cs:effectRef idx="0"/>
+    <cs:fontRef idx="minor">
+      <a:schemeClr val="dk1"/>
+    </cs:fontRef>
+    <cs:spPr>
+      <a:solidFill>
+        <a:schemeClr val="lt1"/>
+      </a:solidFill>
+      <a:ln w="9525">
+        <a:solidFill>
+          <a:schemeClr val="tx1">
+            <a:lumMod val="15000"/>
+            <a:lumOff val="85000"/>
+          </a:schemeClr>
+        </a:solidFill>
+      </a:ln>
+    </cs:spPr>
+  </cs:upBar>
+  <cs:valueAxis>
+    <cs:lnRef idx="0"/>
+    <cs:fillRef idx="0"/>
+    <cs:effectRef idx="0"/>
+    <cs:fontRef idx="minor">
+      <a:schemeClr val="tx1">
+        <a:lumMod val="65000"/>
+        <a:lumOff val="35000"/>
+      </a:schemeClr>
+    </cs:fontRef>
+    <cs:defRPr sz="1197" kern="1200"/>
+  </cs:valueAxis>
+  <cs:wall>
+    <cs:lnRef idx="0"/>
+    <cs:fillRef idx="0"/>
+    <cs:effectRef idx="0"/>
+    <cs:fontRef idx="minor">
+      <a:schemeClr val="tx1"/>
+    </cs:fontRef>
+    <cs:spPr>
+      <a:noFill/>
+      <a:ln>
+        <a:noFill/>
+      </a:ln>
+    </cs:spPr>
+  </cs:wall>
+</cs:chartStyle>
+</file>
+
 <file path=ppt/notesMasters/notesMaster1.xml><?xml version="1.0" encoding="utf-8"?>
 <p:notesMaster xmlns:a="http://schemas.openxmlformats.org/drawingml/2006/main" xmlns:r="http://schemas.openxmlformats.org/officeDocument/2006/relationships" xmlns:p="http://schemas.openxmlformats.org/presentationml/2006/main">
   <p:cSld>
@@ -3078,7 +4026,7 @@
           <a:p>
             <a:fld id="{4B930113-1D5D-45A3-BB00-82103515EEF3}" type="datetimeFigureOut">
               <a:rPr lang="en-US" smtClean="0"/>
-              <a:t>6/13/2018</a:t>
+              <a:t>6/15/2018</a:t>
             </a:fld>
             <a:endParaRPr lang="en-US"/>
           </a:p>
@@ -3520,104 +4468,6 @@
     <p:extLst>
       <p:ext uri="{BB962C8B-B14F-4D97-AF65-F5344CB8AC3E}">
         <p14:creationId xmlns:p14="http://schemas.microsoft.com/office/powerpoint/2010/main" val="2887703612"/>
-      </p:ext>
-    </p:extLst>
-  </p:cSld>
-  <p:clrMapOvr>
-    <a:masterClrMapping/>
-  </p:clrMapOvr>
-</p:notes>
-</file>
-
-<file path=ppt/notesSlides/notesSlide3.xml><?xml version="1.0" encoding="utf-8"?>
-<p:notes xmlns:a="http://schemas.openxmlformats.org/drawingml/2006/main" xmlns:r="http://schemas.openxmlformats.org/officeDocument/2006/relationships" xmlns:p="http://schemas.openxmlformats.org/presentationml/2006/main">
-  <p:cSld>
-    <p:spTree>
-      <p:nvGrpSpPr>
-        <p:cNvPr id="1" name=""/>
-        <p:cNvGrpSpPr/>
-        <p:nvPr/>
-      </p:nvGrpSpPr>
-      <p:grpSpPr>
-        <a:xfrm>
-          <a:off x="0" y="0"/>
-          <a:ext cx="0" cy="0"/>
-          <a:chOff x="0" y="0"/>
-          <a:chExt cx="0" cy="0"/>
-        </a:xfrm>
-      </p:grpSpPr>
-      <p:sp>
-        <p:nvSpPr>
-          <p:cNvPr id="2" name="Slide Image Placeholder 1"/>
-          <p:cNvSpPr>
-            <a:spLocks noGrp="1" noRot="1" noChangeAspect="1"/>
-          </p:cNvSpPr>
-          <p:nvPr>
-            <p:ph type="sldImg"/>
-          </p:nvPr>
-        </p:nvSpPr>
-        <p:spPr>
-          <a:xfrm>
-            <a:off x="685800" y="685800"/>
-            <a:ext cx="5486400" cy="3429000"/>
-          </a:xfrm>
-        </p:spPr>
-      </p:sp>
-      <p:sp>
-        <p:nvSpPr>
-          <p:cNvPr id="3" name="Notes Placeholder 2"/>
-          <p:cNvSpPr>
-            <a:spLocks noGrp="1"/>
-          </p:cNvSpPr>
-          <p:nvPr>
-            <p:ph type="body" idx="1"/>
-          </p:nvPr>
-        </p:nvSpPr>
-        <p:spPr/>
-        <p:txBody>
-          <a:bodyPr/>
-          <a:lstStyle/>
-          <a:p>
-            <a:endParaRPr lang="en-US" dirty="0"/>
-          </a:p>
-        </p:txBody>
-      </p:sp>
-      <p:sp>
-        <p:nvSpPr>
-          <p:cNvPr id="4" name="Slide Number Placeholder 3"/>
-          <p:cNvSpPr>
-            <a:spLocks noGrp="1"/>
-          </p:cNvSpPr>
-          <p:nvPr>
-            <p:ph type="sldNum" sz="quarter" idx="10"/>
-          </p:nvPr>
-        </p:nvSpPr>
-        <p:spPr/>
-        <p:txBody>
-          <a:bodyPr/>
-          <a:lstStyle/>
-          <a:p>
-            <a:fld id="{0EFCAAD8-4F9A-44BB-883C-B166667ADF26}" type="slidenum">
-              <a:rPr lang="en-US" smtClean="0">
-                <a:solidFill>
-                  <a:prstClr val="black"/>
-                </a:solidFill>
-              </a:rPr>
-              <a:pPr/>
-              <a:t>39</a:t>
-            </a:fld>
-            <a:endParaRPr lang="en-US">
-              <a:solidFill>
-                <a:prstClr val="black"/>
-              </a:solidFill>
-            </a:endParaRPr>
-          </a:p>
-        </p:txBody>
-      </p:sp>
-    </p:spTree>
-    <p:extLst>
-      <p:ext uri="{BB962C8B-B14F-4D97-AF65-F5344CB8AC3E}">
-        <p14:creationId xmlns:p14="http://schemas.microsoft.com/office/powerpoint/2010/main" val="198551491"/>
       </p:ext>
     </p:extLst>
   </p:cSld>
@@ -28204,8 +29054,8 @@
         </p:nvSpPr>
         <p:spPr>
           <a:xfrm>
-            <a:off x="762002" y="723900"/>
-            <a:ext cx="7924798" cy="5262979"/>
+            <a:off x="461966" y="723900"/>
+            <a:ext cx="8224834" cy="4909036"/>
           </a:xfrm>
         </p:spPr>
         <p:txBody>
@@ -28216,7 +29066,7 @@
               <a:buNone/>
             </a:pPr>
             <a:r>
-              <a:rPr lang="en-US" sz="1800" dirty="0"/>
+              <a:rPr lang="en-US" sz="1600" dirty="0"/>
               <a:t>Test Methods:</a:t>
             </a:r>
           </a:p>
@@ -28272,7 +29122,7 @@
               <a:buNone/>
             </a:pPr>
             <a:r>
-              <a:rPr lang="en-US" sz="1800" dirty="0"/>
+              <a:rPr lang="en-US" sz="1600" dirty="0"/>
               <a:t>Target Metrics:</a:t>
             </a:r>
           </a:p>
@@ -28299,10 +29149,8 @@
           <a:p>
             <a:r>
               <a:rPr lang="en-US" sz="1800" b="0" dirty="0"/>
-              <a:t>Measure accuracy of predictions via Jaccard index (intersection over union)</a:t>
+              <a:t>Measure accuracy of predictions</a:t>
             </a:r>
-          </a:p>
-          <a:p>
             <a:endParaRPr lang="en-US" sz="1800" dirty="0"/>
           </a:p>
         </p:txBody>
@@ -28383,8 +29231,8 @@
         </p:nvSpPr>
         <p:spPr>
           <a:xfrm>
-            <a:off x="461966" y="678747"/>
-            <a:ext cx="8224837" cy="2077492"/>
+            <a:off x="461967" y="678747"/>
+            <a:ext cx="4567233" cy="4447371"/>
           </a:xfrm>
         </p:spPr>
         <p:txBody>
@@ -28416,64 +29264,22 @@
           <a:p>
             <a:endParaRPr lang="en-US" b="0" dirty="0"/>
           </a:p>
+          <a:p>
+            <a:r>
+              <a:rPr lang="en-US" b="0" dirty="0"/>
+              <a:t>Games that timed out were </a:t>
+            </a:r>
+            <a:r>
+              <a:rPr lang="en-US" b="0"/>
+              <a:t>not counted</a:t>
+            </a:r>
+            <a:endParaRPr lang="en-US" b="0" dirty="0"/>
+          </a:p>
+          <a:p>
+            <a:endParaRPr lang="en-US" b="0" dirty="0"/>
+          </a:p>
         </p:txBody>
       </p:sp>
-      <p:graphicFrame>
-        <p:nvGraphicFramePr>
-          <p:cNvPr id="6" name="Chart 5">
-            <a:extLst>
-              <a:ext uri="{FF2B5EF4-FFF2-40B4-BE49-F238E27FC236}">
-                <a16:creationId xmlns:a16="http://schemas.microsoft.com/office/drawing/2014/main" id="{47351695-499D-4184-A0B3-4E66DD9793D7}"/>
-              </a:ext>
-            </a:extLst>
-          </p:cNvPr>
-          <p:cNvGraphicFramePr/>
-          <p:nvPr>
-            <p:extLst>
-              <p:ext uri="{D42A27DB-BD31-4B8C-83A1-F6EECF244321}">
-                <p14:modId xmlns:p14="http://schemas.microsoft.com/office/powerpoint/2010/main" val="88670093"/>
-              </p:ext>
-            </p:extLst>
-          </p:nvPr>
-        </p:nvGraphicFramePr>
-        <p:xfrm>
-          <a:off x="647756" y="2313342"/>
-          <a:ext cx="2524125" cy="3200400"/>
-        </p:xfrm>
-        <a:graphic>
-          <a:graphicData uri="http://schemas.openxmlformats.org/drawingml/2006/chart">
-            <c:chart xmlns:c="http://schemas.openxmlformats.org/drawingml/2006/chart" xmlns:r="http://schemas.openxmlformats.org/officeDocument/2006/relationships" r:id="rId2"/>
-          </a:graphicData>
-        </a:graphic>
-      </p:graphicFrame>
-      <p:graphicFrame>
-        <p:nvGraphicFramePr>
-          <p:cNvPr id="5" name="Chart 4">
-            <a:extLst>
-              <a:ext uri="{FF2B5EF4-FFF2-40B4-BE49-F238E27FC236}">
-                <a16:creationId xmlns:a16="http://schemas.microsoft.com/office/drawing/2014/main" id="{B4E83A27-1A36-4172-87D9-B460D7877E7D}"/>
-              </a:ext>
-            </a:extLst>
-          </p:cNvPr>
-          <p:cNvGraphicFramePr/>
-          <p:nvPr>
-            <p:extLst>
-              <p:ext uri="{D42A27DB-BD31-4B8C-83A1-F6EECF244321}">
-                <p14:modId xmlns:p14="http://schemas.microsoft.com/office/powerpoint/2010/main" val="1249931724"/>
-              </p:ext>
-            </p:extLst>
-          </p:nvPr>
-        </p:nvGraphicFramePr>
-        <p:xfrm>
-          <a:off x="6172250" y="2324100"/>
-          <a:ext cx="2524125" cy="3200400"/>
-        </p:xfrm>
-        <a:graphic>
-          <a:graphicData uri="http://schemas.openxmlformats.org/drawingml/2006/chart">
-            <c:chart xmlns:c="http://schemas.openxmlformats.org/drawingml/2006/chart" xmlns:r="http://schemas.openxmlformats.org/officeDocument/2006/relationships" r:id="rId3"/>
-          </a:graphicData>
-        </a:graphic>
-      </p:graphicFrame>
       <p:graphicFrame>
         <p:nvGraphicFramePr>
           <p:cNvPr id="7" name="Chart 6">
@@ -28487,18 +29293,18 @@
           <p:nvPr>
             <p:extLst>
               <p:ext uri="{D42A27DB-BD31-4B8C-83A1-F6EECF244321}">
-                <p14:modId xmlns:p14="http://schemas.microsoft.com/office/powerpoint/2010/main" val="8235228"/>
+                <p14:modId xmlns:p14="http://schemas.microsoft.com/office/powerpoint/2010/main" val="284301220"/>
               </p:ext>
             </p:extLst>
           </p:nvPr>
         </p:nvGraphicFramePr>
         <p:xfrm>
-          <a:off x="3372351" y="2324100"/>
-          <a:ext cx="2524125" cy="3200400"/>
+          <a:off x="5262281" y="876300"/>
+          <a:ext cx="3417959" cy="4333714"/>
         </p:xfrm>
         <a:graphic>
           <a:graphicData uri="http://schemas.openxmlformats.org/drawingml/2006/chart">
-            <c:chart xmlns:c="http://schemas.openxmlformats.org/drawingml/2006/chart" xmlns:r="http://schemas.openxmlformats.org/officeDocument/2006/relationships" r:id="rId4"/>
+            <c:chart xmlns:c="http://schemas.openxmlformats.org/drawingml/2006/chart" xmlns:r="http://schemas.openxmlformats.org/officeDocument/2006/relationships" r:id="rId2"/>
           </a:graphicData>
         </a:graphic>
       </p:graphicFrame>
@@ -28578,8 +29384,8 @@
         </p:nvSpPr>
         <p:spPr>
           <a:xfrm>
-            <a:off x="461969" y="1128829"/>
-            <a:ext cx="8224837" cy="369332"/>
+            <a:off x="427007" y="839234"/>
+            <a:ext cx="8564593" cy="4585871"/>
           </a:xfrm>
         </p:spPr>
         <p:txBody>
@@ -28587,46 +29393,61 @@
           <a:lstStyle/>
           <a:p>
             <a:r>
-              <a:rPr lang="en-US" dirty="0"/>
-              <a:t>TBD</a:t>
+              <a:rPr lang="en-US" b="0" dirty="0"/>
+              <a:t>The first 100 games were evaluated for predictive accuracy</a:t>
+            </a:r>
+          </a:p>
+          <a:p>
+            <a:r>
+              <a:rPr lang="en-US" b="0" dirty="0"/>
+              <a:t>Rules:</a:t>
+            </a:r>
+          </a:p>
+          <a:p>
+            <a:pPr lvl="1"/>
+            <a:r>
+              <a:rPr lang="en-US" sz="1800" b="0" dirty="0"/>
+              <a:t>If a game ended before a single offensive enemy unit was built, it was thrown out</a:t>
+            </a:r>
+          </a:p>
+          <a:p>
+            <a:pPr lvl="1"/>
+            <a:r>
+              <a:rPr lang="en-US" sz="1800" b="0" dirty="0"/>
+              <a:t>If a game timed out with no winner, it was thrown out</a:t>
+            </a:r>
+          </a:p>
+          <a:p>
+            <a:pPr lvl="1"/>
+            <a:r>
+              <a:rPr lang="en-US" sz="1800" b="0" dirty="0"/>
+              <a:t>A prediction was marked as “correct” if a matching strategy appeared in the top 3 strategies identified</a:t>
+            </a:r>
+          </a:p>
+          <a:p>
+            <a:pPr lvl="1"/>
+            <a:r>
+              <a:rPr lang="en-US" sz="1800" b="0" dirty="0"/>
+              <a:t>A prediction was marked wrong in all other instances</a:t>
+            </a:r>
+          </a:p>
+          <a:p>
+            <a:endParaRPr lang="en-US" b="0" dirty="0"/>
+          </a:p>
+          <a:p>
+            <a:r>
+              <a:rPr lang="en-US" b="0" dirty="0"/>
+              <a:t>Because nearly all games ended within the first few minutes, some strategies were never predicted due to requiring late-game units</a:t>
+            </a:r>
+          </a:p>
+          <a:p>
+            <a:r>
+              <a:rPr lang="en-US" b="0" dirty="0"/>
+              <a:t>Game results were manually examined for accuracy</a:t>
             </a:r>
           </a:p>
         </p:txBody>
       </p:sp>
-      <p:pic>
-        <p:nvPicPr>
-          <p:cNvPr id="4" name="Picture 3">
-            <a:extLst>
-              <a:ext uri="{FF2B5EF4-FFF2-40B4-BE49-F238E27FC236}">
-                <a16:creationId xmlns:a16="http://schemas.microsoft.com/office/drawing/2014/main" id="{5DC4BC1F-8A61-4D50-8A39-3173A4ED2F34}"/>
-              </a:ext>
-            </a:extLst>
-          </p:cNvPr>
-          <p:cNvPicPr/>
-          <p:nvPr/>
-        </p:nvPicPr>
-        <p:blipFill>
-          <a:blip r:embed="rId2">
-            <a:extLst>
-              <a:ext uri="{28A0092B-C50C-407E-A947-70E740481C1C}">
-                <a14:useLocalDpi xmlns:a14="http://schemas.microsoft.com/office/drawing/2010/main" val="0"/>
-              </a:ext>
-            </a:extLst>
-          </a:blip>
-          <a:stretch>
-            <a:fillRect/>
-          </a:stretch>
-        </p:blipFill>
-        <p:spPr>
-          <a:xfrm>
-            <a:off x="2687637" y="3924300"/>
-            <a:ext cx="3768725" cy="721995"/>
-          </a:xfrm>
-          <a:prstGeom prst="rect">
-            <a:avLst/>
-          </a:prstGeom>
-        </p:spPr>
-      </p:pic>
     </p:spTree>
     <p:extLst>
       <p:ext uri="{BB962C8B-B14F-4D97-AF65-F5344CB8AC3E}">
@@ -28641,6 +29462,162 @@
 </file>
 
 <file path=ppt/slides/slide36.xml><?xml version="1.0" encoding="utf-8"?>
+<p:sld xmlns:a="http://schemas.openxmlformats.org/drawingml/2006/main" xmlns:r="http://schemas.openxmlformats.org/officeDocument/2006/relationships" xmlns:p="http://schemas.openxmlformats.org/presentationml/2006/main">
+  <p:cSld>
+    <p:spTree>
+      <p:nvGrpSpPr>
+        <p:cNvPr id="1" name=""/>
+        <p:cNvGrpSpPr/>
+        <p:nvPr/>
+      </p:nvGrpSpPr>
+      <p:grpSpPr>
+        <a:xfrm>
+          <a:off x="0" y="0"/>
+          <a:ext cx="0" cy="0"/>
+          <a:chOff x="0" y="0"/>
+          <a:chExt cx="0" cy="0"/>
+        </a:xfrm>
+      </p:grpSpPr>
+      <p:sp>
+        <p:nvSpPr>
+          <p:cNvPr id="2" name="Title 1">
+            <a:extLst>
+              <a:ext uri="{FF2B5EF4-FFF2-40B4-BE49-F238E27FC236}">
+                <a16:creationId xmlns:a16="http://schemas.microsoft.com/office/drawing/2014/main" id="{1BF869AA-AAB3-446F-B401-315F0C5CFC77}"/>
+              </a:ext>
+            </a:extLst>
+          </p:cNvPr>
+          <p:cNvSpPr>
+            <a:spLocks noGrp="1"/>
+          </p:cNvSpPr>
+          <p:nvPr>
+            <p:ph type="title"/>
+          </p:nvPr>
+        </p:nvSpPr>
+        <p:spPr/>
+        <p:txBody>
+          <a:bodyPr/>
+          <a:lstStyle/>
+          <a:p>
+            <a:r>
+              <a:rPr lang="en-US" dirty="0"/>
+              <a:t>Results – Predictive Accuracy </a:t>
+            </a:r>
+          </a:p>
+        </p:txBody>
+      </p:sp>
+      <p:sp>
+        <p:nvSpPr>
+          <p:cNvPr id="3" name="Content Placeholder 2">
+            <a:extLst>
+              <a:ext uri="{FF2B5EF4-FFF2-40B4-BE49-F238E27FC236}">
+                <a16:creationId xmlns:a16="http://schemas.microsoft.com/office/drawing/2014/main" id="{06D89978-9B22-42B6-B28C-7A630B23D281}"/>
+              </a:ext>
+            </a:extLst>
+          </p:cNvPr>
+          <p:cNvSpPr>
+            <a:spLocks noGrp="1"/>
+          </p:cNvSpPr>
+          <p:nvPr>
+            <p:ph idx="1"/>
+          </p:nvPr>
+        </p:nvSpPr>
+        <p:spPr>
+          <a:xfrm>
+            <a:off x="427007" y="839234"/>
+            <a:ext cx="8224837" cy="4416594"/>
+          </a:xfrm>
+        </p:spPr>
+        <p:txBody>
+          <a:bodyPr/>
+          <a:lstStyle/>
+          <a:p>
+            <a:pPr marL="0" indent="0">
+              <a:buNone/>
+            </a:pPr>
+            <a:r>
+              <a:rPr lang="en-US" sz="2800" dirty="0"/>
+              <a:t>Tally:</a:t>
+            </a:r>
+          </a:p>
+          <a:p>
+            <a:pPr marL="285750" indent="-285750">
+              <a:buFont typeface="Arial" panose="020B0604020202020204" pitchFamily="34" charset="0"/>
+              <a:buChar char="•"/>
+            </a:pPr>
+            <a:r>
+              <a:rPr lang="en-US" sz="2800" b="0" dirty="0"/>
+              <a:t>61 valid games recorded</a:t>
+            </a:r>
+          </a:p>
+          <a:p>
+            <a:pPr marL="285750" indent="-285750">
+              <a:buFont typeface="Arial" panose="020B0604020202020204" pitchFamily="34" charset="0"/>
+              <a:buChar char="•"/>
+            </a:pPr>
+            <a:r>
+              <a:rPr lang="en-US" sz="2800" b="0" dirty="0"/>
+              <a:t>32 ended too soon (30 of which were superficially correct)</a:t>
+            </a:r>
+          </a:p>
+          <a:p>
+            <a:pPr marL="285750" indent="-285750">
+              <a:buFont typeface="Arial" panose="020B0604020202020204" pitchFamily="34" charset="0"/>
+              <a:buChar char="•"/>
+            </a:pPr>
+            <a:r>
+              <a:rPr lang="en-US" sz="2800" b="0" dirty="0"/>
+              <a:t>7 timed out</a:t>
+            </a:r>
+          </a:p>
+          <a:p>
+            <a:pPr marL="285750" indent="-285750">
+              <a:buFont typeface="Arial" panose="020B0604020202020204" pitchFamily="34" charset="0"/>
+              <a:buChar char="•"/>
+            </a:pPr>
+            <a:r>
+              <a:rPr lang="en-US" sz="2800" b="0" dirty="0"/>
+              <a:t>58 correct</a:t>
+            </a:r>
+          </a:p>
+          <a:p>
+            <a:pPr marL="285750" indent="-285750">
+              <a:buFont typeface="Arial" panose="020B0604020202020204" pitchFamily="34" charset="0"/>
+              <a:buChar char="•"/>
+            </a:pPr>
+            <a:r>
+              <a:rPr lang="en-US" sz="2800" b="0" dirty="0"/>
+              <a:t>3 wrong</a:t>
+            </a:r>
+          </a:p>
+          <a:p>
+            <a:endParaRPr lang="en-US" sz="2800" b="0" dirty="0"/>
+          </a:p>
+          <a:p>
+            <a:pPr marL="0" indent="0">
+              <a:buNone/>
+            </a:pPr>
+            <a:r>
+              <a:rPr lang="en-US" sz="2800" b="0" dirty="0"/>
+              <a:t>Overall Accuracy: 95%</a:t>
+            </a:r>
+          </a:p>
+        </p:txBody>
+      </p:sp>
+    </p:spTree>
+    <p:extLst>
+      <p:ext uri="{BB962C8B-B14F-4D97-AF65-F5344CB8AC3E}">
+        <p14:creationId xmlns:p14="http://schemas.microsoft.com/office/powerpoint/2010/main" val="1151476645"/>
+      </p:ext>
+    </p:extLst>
+  </p:cSld>
+  <p:clrMapOvr>
+    <a:masterClrMapping/>
+  </p:clrMapOvr>
+</p:sld>
+</file>
+
+<file path=ppt/slides/slide37.xml><?xml version="1.0" encoding="utf-8"?>
 <p:sld xmlns:a="http://schemas.openxmlformats.org/drawingml/2006/main" xmlns:r="http://schemas.openxmlformats.org/officeDocument/2006/relationships" xmlns:p="http://schemas.openxmlformats.org/presentationml/2006/main">
   <p:cSld>
     <p:spTree>
@@ -28704,7 +29681,7 @@
 </p:sld>
 </file>
 
-<file path=ppt/slides/slide37.xml><?xml version="1.0" encoding="utf-8"?>
+<file path=ppt/slides/slide38.xml><?xml version="1.0" encoding="utf-8"?>
 <p:sld xmlns:a="http://schemas.openxmlformats.org/drawingml/2006/main" xmlns:r="http://schemas.openxmlformats.org/officeDocument/2006/relationships" xmlns:p="http://schemas.openxmlformats.org/presentationml/2006/main">
   <p:cSld>
     <p:spTree>
@@ -28850,7 +29827,7 @@
 </p:sld>
 </file>
 
-<file path=ppt/slides/slide38.xml><?xml version="1.0" encoding="utf-8"?>
+<file path=ppt/slides/slide39.xml><?xml version="1.0" encoding="utf-8"?>
 <p:sld xmlns:a="http://schemas.openxmlformats.org/drawingml/2006/main" xmlns:r="http://schemas.openxmlformats.org/officeDocument/2006/relationships" xmlns:p="http://schemas.openxmlformats.org/presentationml/2006/main">
   <p:cSld>
     <p:spTree>
@@ -28947,36 +29924,6 @@
     <p:extLst>
       <p:ext uri="{BB962C8B-B14F-4D97-AF65-F5344CB8AC3E}">
         <p14:creationId xmlns:p14="http://schemas.microsoft.com/office/powerpoint/2010/main" val="1977857600"/>
-      </p:ext>
-    </p:extLst>
-  </p:cSld>
-  <p:clrMapOvr>
-    <a:masterClrMapping/>
-  </p:clrMapOvr>
-</p:sld>
-</file>
-
-<file path=ppt/slides/slide39.xml><?xml version="1.0" encoding="utf-8"?>
-<p:sld xmlns:a="http://schemas.openxmlformats.org/drawingml/2006/main" xmlns:r="http://schemas.openxmlformats.org/officeDocument/2006/relationships" xmlns:p="http://schemas.openxmlformats.org/presentationml/2006/main">
-  <p:cSld>
-    <p:spTree>
-      <p:nvGrpSpPr>
-        <p:cNvPr id="1" name=""/>
-        <p:cNvGrpSpPr/>
-        <p:nvPr/>
-      </p:nvGrpSpPr>
-      <p:grpSpPr>
-        <a:xfrm>
-          <a:off x="0" y="0"/>
-          <a:ext cx="0" cy="0"/>
-          <a:chOff x="0" y="0"/>
-          <a:chExt cx="0" cy="0"/>
-        </a:xfrm>
-      </p:grpSpPr>
-    </p:spTree>
-    <p:extLst>
-      <p:ext uri="{BB962C8B-B14F-4D97-AF65-F5344CB8AC3E}">
-        <p14:creationId xmlns:p14="http://schemas.microsoft.com/office/powerpoint/2010/main" val="4064850955"/>
       </p:ext>
     </p:extLst>
   </p:cSld>
@@ -29115,6 +30062,614 @@
 </file>
 
 <file path=ppt/slides/slide40.xml><?xml version="1.0" encoding="utf-8"?>
+<p:sld xmlns:a="http://schemas.openxmlformats.org/drawingml/2006/main" xmlns:r="http://schemas.openxmlformats.org/officeDocument/2006/relationships" xmlns:p="http://schemas.openxmlformats.org/presentationml/2006/main">
+  <p:cSld>
+    <p:spTree>
+      <p:nvGrpSpPr>
+        <p:cNvPr id="1" name=""/>
+        <p:cNvGrpSpPr/>
+        <p:nvPr/>
+      </p:nvGrpSpPr>
+      <p:grpSpPr>
+        <a:xfrm>
+          <a:off x="0" y="0"/>
+          <a:ext cx="0" cy="0"/>
+          <a:chOff x="0" y="0"/>
+          <a:chExt cx="0" cy="0"/>
+        </a:xfrm>
+      </p:grpSpPr>
+    </p:spTree>
+    <p:extLst>
+      <p:ext uri="{BB962C8B-B14F-4D97-AF65-F5344CB8AC3E}">
+        <p14:creationId xmlns:p14="http://schemas.microsoft.com/office/powerpoint/2010/main" val="1307661557"/>
+      </p:ext>
+    </p:extLst>
+  </p:cSld>
+  <p:clrMapOvr>
+    <a:masterClrMapping/>
+  </p:clrMapOvr>
+</p:sld>
+</file>
+
+<file path=ppt/slides/slide41.xml><?xml version="1.0" encoding="utf-8"?>
+<p:sld xmlns:a="http://schemas.openxmlformats.org/drawingml/2006/main" xmlns:r="http://schemas.openxmlformats.org/officeDocument/2006/relationships" xmlns:p="http://schemas.openxmlformats.org/presentationml/2006/main">
+  <p:cSld>
+    <p:spTree>
+      <p:nvGrpSpPr>
+        <p:cNvPr id="1" name=""/>
+        <p:cNvGrpSpPr/>
+        <p:nvPr/>
+      </p:nvGrpSpPr>
+      <p:grpSpPr>
+        <a:xfrm>
+          <a:off x="0" y="0"/>
+          <a:ext cx="0" cy="0"/>
+          <a:chOff x="0" y="0"/>
+          <a:chExt cx="0" cy="0"/>
+        </a:xfrm>
+      </p:grpSpPr>
+      <p:sp>
+        <p:nvSpPr>
+          <p:cNvPr id="2" name="Title 1">
+            <a:extLst>
+              <a:ext uri="{FF2B5EF4-FFF2-40B4-BE49-F238E27FC236}">
+                <a16:creationId xmlns:a16="http://schemas.microsoft.com/office/drawing/2014/main" id="{24E68F1D-741D-4D4D-B165-27596908A52E}"/>
+              </a:ext>
+            </a:extLst>
+          </p:cNvPr>
+          <p:cNvSpPr>
+            <a:spLocks noGrp="1"/>
+          </p:cNvSpPr>
+          <p:nvPr>
+            <p:ph type="title"/>
+          </p:nvPr>
+        </p:nvSpPr>
+        <p:spPr/>
+        <p:txBody>
+          <a:bodyPr/>
+          <a:lstStyle/>
+          <a:p>
+            <a:endParaRPr lang="en-US"/>
+          </a:p>
+        </p:txBody>
+      </p:sp>
+      <p:sp>
+        <p:nvSpPr>
+          <p:cNvPr id="3" name="Content Placeholder 2">
+            <a:extLst>
+              <a:ext uri="{FF2B5EF4-FFF2-40B4-BE49-F238E27FC236}">
+                <a16:creationId xmlns:a16="http://schemas.microsoft.com/office/drawing/2014/main" id="{76ACBD06-F31E-42E0-97DC-8ED11FB70E59}"/>
+              </a:ext>
+            </a:extLst>
+          </p:cNvPr>
+          <p:cNvSpPr>
+            <a:spLocks noGrp="1"/>
+          </p:cNvSpPr>
+          <p:nvPr>
+            <p:ph idx="1"/>
+          </p:nvPr>
+        </p:nvSpPr>
+        <p:spPr>
+          <a:xfrm>
+            <a:off x="450256" y="723900"/>
+            <a:ext cx="8224837" cy="1708160"/>
+          </a:xfrm>
+        </p:spPr>
+        <p:txBody>
+          <a:bodyPr/>
+          <a:lstStyle/>
+          <a:p>
+            <a:r>
+              <a:rPr lang="en-US" sz="1200" b="0" dirty="0"/>
+              <a:t>I was looking at the results, and it seems that Nova by itself has a higher win rate, which is surprising. What you mention of waiting  for a minute or so before having IRE start to have an influence might be something to try. Is it very hard to try?</a:t>
+            </a:r>
+          </a:p>
+          <a:p>
+            <a:br>
+              <a:rPr lang="en-US" sz="1200" b="0" dirty="0"/>
+            </a:br>
+            <a:endParaRPr lang="en-US" sz="1200" b="0" dirty="0"/>
+          </a:p>
+          <a:p>
+            <a:r>
+              <a:rPr lang="en-US" sz="1200" b="0" dirty="0"/>
+              <a:t>Concerning the slides:</a:t>
+            </a:r>
+          </a:p>
+          <a:p>
+            <a:r>
+              <a:rPr lang="en-US" sz="1200" b="0" dirty="0"/>
+              <a:t>- Also, concerning the results, I think the important result would be how accurate is IRE. If those results are good, then the fact that Nova loses more games doesn’t matter that much. Since, we can always say that we might not be exploiting all the information IRE can infer properly in Nova. So, as long as IRE is predicting the opponent strategy accurately, we are good!</a:t>
+            </a:r>
+          </a:p>
+        </p:txBody>
+      </p:sp>
+    </p:spTree>
+    <p:extLst>
+      <p:ext uri="{BB962C8B-B14F-4D97-AF65-F5344CB8AC3E}">
+        <p14:creationId xmlns:p14="http://schemas.microsoft.com/office/powerpoint/2010/main" val="4230003291"/>
+      </p:ext>
+    </p:extLst>
+  </p:cSld>
+  <p:clrMapOvr>
+    <a:masterClrMapping/>
+  </p:clrMapOvr>
+</p:sld>
+</file>
+
+<file path=ppt/slides/slide42.xml><?xml version="1.0" encoding="utf-8"?>
+<p:sld xmlns:a="http://schemas.openxmlformats.org/drawingml/2006/main" xmlns:r="http://schemas.openxmlformats.org/officeDocument/2006/relationships" xmlns:p="http://schemas.openxmlformats.org/presentationml/2006/main">
+  <p:cSld>
+    <p:spTree>
+      <p:nvGrpSpPr>
+        <p:cNvPr id="1" name=""/>
+        <p:cNvGrpSpPr/>
+        <p:nvPr/>
+      </p:nvGrpSpPr>
+      <p:grpSpPr>
+        <a:xfrm>
+          <a:off x="0" y="0"/>
+          <a:ext cx="0" cy="0"/>
+          <a:chOff x="0" y="0"/>
+          <a:chExt cx="0" cy="0"/>
+        </a:xfrm>
+      </p:grpSpPr>
+      <p:sp>
+        <p:nvSpPr>
+          <p:cNvPr id="2" name="Title 1">
+            <a:extLst>
+              <a:ext uri="{FF2B5EF4-FFF2-40B4-BE49-F238E27FC236}">
+                <a16:creationId xmlns:a16="http://schemas.microsoft.com/office/drawing/2014/main" id="{B8405948-CDAD-40F7-B28F-C4A69DDFBD5B}"/>
+              </a:ext>
+            </a:extLst>
+          </p:cNvPr>
+          <p:cNvSpPr>
+            <a:spLocks noGrp="1"/>
+          </p:cNvSpPr>
+          <p:nvPr>
+            <p:ph type="title"/>
+          </p:nvPr>
+        </p:nvSpPr>
+        <p:spPr/>
+        <p:txBody>
+          <a:bodyPr/>
+          <a:lstStyle/>
+          <a:p>
+            <a:r>
+              <a:rPr lang="en-US" dirty="0"/>
+              <a:t>Sample Game Log</a:t>
+            </a:r>
+          </a:p>
+        </p:txBody>
+      </p:sp>
+      <p:sp>
+        <p:nvSpPr>
+          <p:cNvPr id="3" name="Content Placeholder 2">
+            <a:extLst>
+              <a:ext uri="{FF2B5EF4-FFF2-40B4-BE49-F238E27FC236}">
+                <a16:creationId xmlns:a16="http://schemas.microsoft.com/office/drawing/2014/main" id="{6C9135BD-FDFB-448C-99E5-A6BE435CC4CD}"/>
+              </a:ext>
+            </a:extLst>
+          </p:cNvPr>
+          <p:cNvSpPr>
+            <a:spLocks noGrp="1"/>
+          </p:cNvSpPr>
+          <p:nvPr>
+            <p:ph idx="1"/>
+          </p:nvPr>
+        </p:nvSpPr>
+        <p:spPr>
+          <a:xfrm>
+            <a:off x="76200" y="647700"/>
+            <a:ext cx="8915400" cy="4739759"/>
+          </a:xfrm>
+        </p:spPr>
+        <p:txBody>
+          <a:bodyPr/>
+          <a:lstStyle/>
+          <a:p>
+            <a:pPr marL="0" indent="0">
+              <a:buNone/>
+            </a:pPr>
+            <a:r>
+              <a:rPr lang="en-US" sz="1400" b="0" dirty="0"/>
+              <a:t>==========================================================================</a:t>
+            </a:r>
+          </a:p>
+          <a:p>
+            <a:pPr marL="0" indent="0">
+              <a:buNone/>
+            </a:pPr>
+            <a:r>
+              <a:rPr lang="en-US" sz="1400" b="0" dirty="0"/>
+              <a:t>                               NEW GAME                                   </a:t>
+            </a:r>
+          </a:p>
+          <a:p>
+            <a:pPr marL="0" indent="0">
+              <a:buNone/>
+            </a:pPr>
+            <a:r>
+              <a:rPr lang="en-US" sz="1400" b="0" dirty="0"/>
+              <a:t>==========================================================================</a:t>
+            </a:r>
+          </a:p>
+          <a:p>
+            <a:pPr marL="0" indent="0">
+              <a:buNone/>
+            </a:pPr>
+            <a:r>
+              <a:rPr lang="en-US" sz="1400" b="0" dirty="0"/>
+              <a:t>Search and Destroy activated!</a:t>
+            </a:r>
+          </a:p>
+          <a:p>
+            <a:pPr marL="0" indent="0">
+              <a:buNone/>
+            </a:pPr>
+            <a:r>
+              <a:rPr lang="en-US" sz="1400" b="0" dirty="0"/>
+              <a:t>Enemy Units:</a:t>
+            </a:r>
+          </a:p>
+          <a:p>
+            <a:pPr marL="0" indent="0">
+              <a:buNone/>
+            </a:pPr>
+            <a:r>
+              <a:rPr lang="en-US" sz="1400" b="0" dirty="0"/>
+              <a:t>    </a:t>
+            </a:r>
+            <a:r>
+              <a:rPr lang="en-US" sz="1400" b="0" dirty="0" err="1"/>
+              <a:t>Protoss_Probe</a:t>
+            </a:r>
+            <a:r>
+              <a:rPr lang="en-US" sz="1400" b="0" dirty="0"/>
+              <a:t>    ID: 142    HP: 0</a:t>
+            </a:r>
+            <a:r>
+              <a:rPr lang="en-US" sz="1400" i="1" dirty="0"/>
+              <a:t> &lt;other probes omitted for space&gt;</a:t>
+            </a:r>
+          </a:p>
+          <a:p>
+            <a:pPr marL="0" indent="0">
+              <a:buNone/>
+            </a:pPr>
+            <a:r>
+              <a:rPr lang="en-US" sz="1400" b="0" dirty="0"/>
+              <a:t>B: </a:t>
+            </a:r>
+            <a:r>
+              <a:rPr lang="en-US" sz="1400" b="0" dirty="0" err="1"/>
+              <a:t>Protoss_Nexus</a:t>
+            </a:r>
+            <a:r>
+              <a:rPr lang="en-US" sz="1400" b="0" dirty="0"/>
+              <a:t>    ID: 14    HP: 0</a:t>
+            </a:r>
+          </a:p>
+          <a:p>
+            <a:pPr marL="0" indent="0">
+              <a:buNone/>
+            </a:pPr>
+            <a:r>
+              <a:rPr lang="en-US" sz="1400" b="0" dirty="0" err="1"/>
+              <a:t>Protoss_Zealot</a:t>
+            </a:r>
+            <a:r>
+              <a:rPr lang="en-US" sz="1400" b="0" dirty="0"/>
+              <a:t>    ID: 145    HP: 0</a:t>
+            </a:r>
+          </a:p>
+          <a:p>
+            <a:pPr marL="0" indent="0">
+              <a:buNone/>
+            </a:pPr>
+            <a:r>
+              <a:rPr lang="en-US" sz="1400" b="0" dirty="0"/>
+              <a:t>B: </a:t>
+            </a:r>
+            <a:r>
+              <a:rPr lang="en-US" sz="1400" b="0" dirty="0" err="1"/>
+              <a:t>Protoss_Pylon</a:t>
+            </a:r>
+            <a:r>
+              <a:rPr lang="en-US" sz="1400" b="0" dirty="0"/>
+              <a:t>    ID: 143    HP: 0</a:t>
+            </a:r>
+          </a:p>
+          <a:p>
+            <a:pPr marL="0" indent="0">
+              <a:buNone/>
+            </a:pPr>
+            <a:r>
+              <a:rPr lang="en-US" sz="1400" b="0" dirty="0"/>
+              <a:t>    B: </a:t>
+            </a:r>
+            <a:r>
+              <a:rPr lang="en-US" sz="1400" b="0" dirty="0" err="1"/>
+              <a:t>Protoss_Gateway</a:t>
+            </a:r>
+            <a:r>
+              <a:rPr lang="en-US" sz="1400" b="0" dirty="0"/>
+              <a:t>    ID: 140    HP: 0</a:t>
+            </a:r>
+          </a:p>
+          <a:p>
+            <a:pPr marL="0" indent="0">
+              <a:buNone/>
+            </a:pPr>
+            <a:r>
+              <a:rPr lang="en-US" sz="1400" b="0" dirty="0"/>
+              <a:t>B: </a:t>
+            </a:r>
+            <a:r>
+              <a:rPr lang="en-US" sz="1400" b="0" dirty="0" err="1"/>
+              <a:t>Protoss_Pylon</a:t>
+            </a:r>
+            <a:r>
+              <a:rPr lang="en-US" sz="1400" b="0" dirty="0"/>
+              <a:t>    ID: 132    HP: 0</a:t>
+            </a:r>
+          </a:p>
+          <a:p>
+            <a:pPr marL="0" indent="0">
+              <a:buNone/>
+            </a:pPr>
+            <a:r>
+              <a:rPr lang="en-US" sz="1400" b="0" dirty="0"/>
+              <a:t>    B: </a:t>
+            </a:r>
+            <a:r>
+              <a:rPr lang="en-US" sz="1400" b="0" dirty="0" err="1"/>
+              <a:t>Protoss_Gateway</a:t>
+            </a:r>
+            <a:r>
+              <a:rPr lang="en-US" sz="1400" b="0" dirty="0"/>
+              <a:t>    ID: 135    HP: 0</a:t>
+            </a:r>
+          </a:p>
+          <a:p>
+            <a:pPr marL="0" indent="0">
+              <a:buNone/>
+            </a:pPr>
+            <a:r>
+              <a:rPr lang="en-US" sz="1400" b="0" dirty="0"/>
+              <a:t>Predicted Strategies: Gateway-</a:t>
+            </a:r>
+            <a:r>
+              <a:rPr lang="en-US" sz="1400" b="0" dirty="0" err="1"/>
+              <a:t>Two_Gates</a:t>
+            </a:r>
+            <a:r>
+              <a:rPr lang="en-US" sz="1400" b="0" dirty="0"/>
+              <a:t>, Gateway-</a:t>
+            </a:r>
+            <a:r>
+              <a:rPr lang="en-US" sz="1400" b="0" dirty="0" err="1"/>
+              <a:t>Fast_DT</a:t>
+            </a:r>
+            <a:r>
+              <a:rPr lang="en-US" sz="1400" b="0" dirty="0"/>
+              <a:t>, Gateway-Templar, Gateway-</a:t>
+            </a:r>
+            <a:r>
+              <a:rPr lang="en-US" sz="1400" b="0" dirty="0" err="1"/>
+              <a:t>Speedzeal</a:t>
+            </a:r>
+            <a:r>
+              <a:rPr lang="en-US" sz="1400" b="0" dirty="0"/>
+              <a:t>, Gateway-Corsair, </a:t>
+            </a:r>
+          </a:p>
+          <a:p>
+            <a:pPr marL="0" indent="0">
+              <a:buNone/>
+            </a:pPr>
+            <a:r>
+              <a:rPr lang="en-US" sz="1400" b="0" dirty="0"/>
+              <a:t>Frames: 9891 winner: 1 enemy: </a:t>
+            </a:r>
+            <a:r>
+              <a:rPr lang="en-US" sz="1400" b="0" dirty="0" err="1"/>
+              <a:t>Protoss</a:t>
+            </a:r>
+            <a:r>
+              <a:rPr lang="en-US" sz="1400" b="0" dirty="0"/>
+              <a:t> </a:t>
+            </a:r>
+            <a:r>
+              <a:rPr lang="en-US" sz="1400" b="0" dirty="0" err="1"/>
+              <a:t>startPosition</a:t>
+            </a:r>
+            <a:r>
+              <a:rPr lang="en-US" sz="1400" b="0" dirty="0"/>
+              <a:t> (400,3032) </a:t>
+            </a:r>
+            <a:r>
+              <a:rPr lang="en-US" sz="1400" b="0" dirty="0" err="1"/>
+              <a:t>myKillScore</a:t>
+            </a:r>
+            <a:r>
+              <a:rPr lang="en-US" sz="1400" b="0" dirty="0"/>
+              <a:t>: 1600 </a:t>
+            </a:r>
+            <a:r>
+              <a:rPr lang="en-US" sz="1400" b="0" dirty="0" err="1"/>
+              <a:t>enemyKillScore</a:t>
+            </a:r>
+            <a:r>
+              <a:rPr lang="en-US" sz="1400" b="0" dirty="0"/>
+              <a:t>: 0 </a:t>
+            </a:r>
+            <a:r>
+              <a:rPr lang="en-US" sz="1400" b="0" dirty="0" err="1"/>
+              <a:t>EvaluationLastState</a:t>
+            </a:r>
+            <a:r>
+              <a:rPr lang="en-US" sz="1400" b="0" dirty="0"/>
+              <a:t>: 1 map: (2)</a:t>
+            </a:r>
+            <a:r>
+              <a:rPr lang="en-US" sz="1400" b="0" dirty="0" err="1"/>
+              <a:t>Benzene.scx</a:t>
+            </a:r>
+            <a:endParaRPr lang="en-US" sz="1400" b="0" dirty="0"/>
+          </a:p>
+          <a:p>
+            <a:pPr marL="0" indent="0">
+              <a:buNone/>
+            </a:pPr>
+            <a:endParaRPr lang="en-US" sz="1400" b="0" dirty="0"/>
+          </a:p>
+        </p:txBody>
+      </p:sp>
+    </p:spTree>
+    <p:extLst>
+      <p:ext uri="{BB962C8B-B14F-4D97-AF65-F5344CB8AC3E}">
+        <p14:creationId xmlns:p14="http://schemas.microsoft.com/office/powerpoint/2010/main" val="2957599552"/>
+      </p:ext>
+    </p:extLst>
+  </p:cSld>
+  <p:clrMapOvr>
+    <a:masterClrMapping/>
+  </p:clrMapOvr>
+</p:sld>
+</file>
+
+<file path=ppt/slides/slide43.xml><?xml version="1.0" encoding="utf-8"?>
+<p:sld xmlns:a="http://schemas.openxmlformats.org/drawingml/2006/main" xmlns:r="http://schemas.openxmlformats.org/officeDocument/2006/relationships" xmlns:p="http://schemas.openxmlformats.org/presentationml/2006/main">
+  <p:cSld>
+    <p:spTree>
+      <p:nvGrpSpPr>
+        <p:cNvPr id="1" name=""/>
+        <p:cNvGrpSpPr/>
+        <p:nvPr/>
+      </p:nvGrpSpPr>
+      <p:grpSpPr>
+        <a:xfrm>
+          <a:off x="0" y="0"/>
+          <a:ext cx="0" cy="0"/>
+          <a:chOff x="0" y="0"/>
+          <a:chExt cx="0" cy="0"/>
+        </a:xfrm>
+      </p:grpSpPr>
+      <p:graphicFrame>
+        <p:nvGraphicFramePr>
+          <p:cNvPr id="6" name="Chart 5">
+            <a:extLst>
+              <a:ext uri="{FF2B5EF4-FFF2-40B4-BE49-F238E27FC236}">
+                <a16:creationId xmlns:a16="http://schemas.microsoft.com/office/drawing/2014/main" id="{47351695-499D-4184-A0B3-4E66DD9793D7}"/>
+              </a:ext>
+            </a:extLst>
+          </p:cNvPr>
+          <p:cNvGraphicFramePr/>
+          <p:nvPr>
+            <p:extLst/>
+          </p:nvPr>
+        </p:nvGraphicFramePr>
+        <p:xfrm>
+          <a:off x="647756" y="2313342"/>
+          <a:ext cx="2524125" cy="3200400"/>
+        </p:xfrm>
+        <a:graphic>
+          <a:graphicData uri="http://schemas.openxmlformats.org/drawingml/2006/chart">
+            <c:chart xmlns:c="http://schemas.openxmlformats.org/drawingml/2006/chart" xmlns:r="http://schemas.openxmlformats.org/officeDocument/2006/relationships" r:id="rId2"/>
+          </a:graphicData>
+        </a:graphic>
+      </p:graphicFrame>
+      <p:graphicFrame>
+        <p:nvGraphicFramePr>
+          <p:cNvPr id="5" name="Chart 4">
+            <a:extLst>
+              <a:ext uri="{FF2B5EF4-FFF2-40B4-BE49-F238E27FC236}">
+                <a16:creationId xmlns:a16="http://schemas.microsoft.com/office/drawing/2014/main" id="{B4E83A27-1A36-4172-87D9-B460D7877E7D}"/>
+              </a:ext>
+            </a:extLst>
+          </p:cNvPr>
+          <p:cNvGraphicFramePr/>
+          <p:nvPr>
+            <p:extLst/>
+          </p:nvPr>
+        </p:nvGraphicFramePr>
+        <p:xfrm>
+          <a:off x="6172250" y="2324100"/>
+          <a:ext cx="2524125" cy="3200400"/>
+        </p:xfrm>
+        <a:graphic>
+          <a:graphicData uri="http://schemas.openxmlformats.org/drawingml/2006/chart">
+            <c:chart xmlns:c="http://schemas.openxmlformats.org/drawingml/2006/chart" xmlns:r="http://schemas.openxmlformats.org/officeDocument/2006/relationships" r:id="rId3"/>
+          </a:graphicData>
+        </a:graphic>
+      </p:graphicFrame>
+      <p:graphicFrame>
+        <p:nvGraphicFramePr>
+          <p:cNvPr id="7" name="Chart 6">
+            <a:extLst>
+              <a:ext uri="{FF2B5EF4-FFF2-40B4-BE49-F238E27FC236}">
+                <a16:creationId xmlns:a16="http://schemas.microsoft.com/office/drawing/2014/main" id="{0829CCA6-9B5B-4761-BA83-DEFF5B9A7AAF}"/>
+              </a:ext>
+            </a:extLst>
+          </p:cNvPr>
+          <p:cNvGraphicFramePr/>
+          <p:nvPr>
+            <p:extLst/>
+          </p:nvPr>
+        </p:nvGraphicFramePr>
+        <p:xfrm>
+          <a:off x="3372351" y="2324100"/>
+          <a:ext cx="2524125" cy="3200400"/>
+        </p:xfrm>
+        <a:graphic>
+          <a:graphicData uri="http://schemas.openxmlformats.org/drawingml/2006/chart">
+            <c:chart xmlns:c="http://schemas.openxmlformats.org/drawingml/2006/chart" xmlns:r="http://schemas.openxmlformats.org/officeDocument/2006/relationships" r:id="rId4"/>
+          </a:graphicData>
+        </a:graphic>
+      </p:graphicFrame>
+      <p:sp>
+        <p:nvSpPr>
+          <p:cNvPr id="10" name="Title 9">
+            <a:extLst>
+              <a:ext uri="{FF2B5EF4-FFF2-40B4-BE49-F238E27FC236}">
+                <a16:creationId xmlns:a16="http://schemas.microsoft.com/office/drawing/2014/main" id="{5FEB1CEE-DAE5-45EA-B8E2-77453D6C6A3D}"/>
+              </a:ext>
+            </a:extLst>
+          </p:cNvPr>
+          <p:cNvSpPr>
+            <a:spLocks noGrp="1"/>
+          </p:cNvSpPr>
+          <p:nvPr>
+            <p:ph type="title"/>
+          </p:nvPr>
+        </p:nvSpPr>
+        <p:spPr/>
+        <p:txBody>
+          <a:bodyPr/>
+          <a:lstStyle/>
+          <a:p>
+            <a:r>
+              <a:rPr lang="en-US" dirty="0"/>
+              <a:t>Tables</a:t>
+            </a:r>
+          </a:p>
+        </p:txBody>
+      </p:sp>
+    </p:spTree>
+    <p:extLst>
+      <p:ext uri="{BB962C8B-B14F-4D97-AF65-F5344CB8AC3E}">
+        <p14:creationId xmlns:p14="http://schemas.microsoft.com/office/powerpoint/2010/main" val="4207298089"/>
+      </p:ext>
+    </p:extLst>
+  </p:cSld>
+  <p:clrMapOvr>
+    <a:masterClrMapping/>
+  </p:clrMapOvr>
+</p:sld>
+</file>
+
+<file path=ppt/slides/slide44.xml><?xml version="1.0" encoding="utf-8"?>
 <p:sld xmlns:a="http://schemas.openxmlformats.org/drawingml/2006/main" xmlns:r="http://schemas.openxmlformats.org/officeDocument/2006/relationships" xmlns:p="http://schemas.openxmlformats.org/presentationml/2006/main">
   <p:cSld>
     <p:spTree>
@@ -30152,7 +31707,7 @@
 </p:sld>
 </file>
 
-<file path=ppt/slides/slide41.xml><?xml version="1.0" encoding="utf-8"?>
+<file path=ppt/slides/slide45.xml><?xml version="1.0" encoding="utf-8"?>
 <p:sld xmlns:a="http://schemas.openxmlformats.org/drawingml/2006/main" xmlns:r="http://schemas.openxmlformats.org/officeDocument/2006/relationships" xmlns:p="http://schemas.openxmlformats.org/presentationml/2006/main">
   <p:cSld>
     <p:spTree>
@@ -33720,7 +35275,7 @@
 </p:sld>
 </file>
 
-<file path=ppt/slides/slide42.xml><?xml version="1.0" encoding="utf-8"?>
+<file path=ppt/slides/slide46.xml><?xml version="1.0" encoding="utf-8"?>
 <p:sld xmlns:a="http://schemas.openxmlformats.org/drawingml/2006/main" xmlns:r="http://schemas.openxmlformats.org/officeDocument/2006/relationships" xmlns:p="http://schemas.openxmlformats.org/presentationml/2006/main">
   <p:cSld>
     <p:spTree>
@@ -34259,7 +35814,7 @@
 </p:sld>
 </file>
 
-<file path=ppt/slides/slide43.xml><?xml version="1.0" encoding="utf-8"?>
+<file path=ppt/slides/slide47.xml><?xml version="1.0" encoding="utf-8"?>
 <p:sld xmlns:a="http://schemas.openxmlformats.org/drawingml/2006/main" xmlns:r="http://schemas.openxmlformats.org/officeDocument/2006/relationships" xmlns:p="http://schemas.openxmlformats.org/presentationml/2006/main">
   <p:cSld>
     <p:spTree>
@@ -34881,7 +36436,7 @@
 </p:sld>
 </file>
 
-<file path=ppt/slides/slide44.xml><?xml version="1.0" encoding="utf-8"?>
+<file path=ppt/slides/slide48.xml><?xml version="1.0" encoding="utf-8"?>
 <p:sld xmlns:a="http://schemas.openxmlformats.org/drawingml/2006/main" xmlns:r="http://schemas.openxmlformats.org/officeDocument/2006/relationships" xmlns:p="http://schemas.openxmlformats.org/presentationml/2006/main">
   <p:cSld>
     <p:spTree>
@@ -35388,7 +36943,7 @@
 </p:sld>
 </file>
 
-<file path=ppt/slides/slide45.xml><?xml version="1.0" encoding="utf-8"?>
+<file path=ppt/slides/slide49.xml><?xml version="1.0" encoding="utf-8"?>
 <p:sld xmlns:a="http://schemas.openxmlformats.org/drawingml/2006/main" xmlns:r="http://schemas.openxmlformats.org/officeDocument/2006/relationships" xmlns:p="http://schemas.openxmlformats.org/presentationml/2006/main">
   <p:cSld>
     <p:spTree>

</xml_diff>